<commit_message>
changed values due to new restaurant table
</commit_message>
<xml_diff>
--- a/Presentation.pptx
+++ b/Presentation.pptx
@@ -3225,21 +3225,39 @@
             <a:pPr lvl="1"/>
             <a:r>
               <a:rPr lang="en-US" dirty="0" smtClean="0"/>
-              <a:t>497 Restaurants</a:t>
-            </a:r>
+              <a:t>286 Restaurants</a:t>
+            </a:r>
+            <a:endParaRPr lang="en-US" dirty="0" smtClean="0"/>
           </a:p>
           <a:p>
             <a:pPr lvl="1"/>
             <a:r>
               <a:rPr lang="en-US" dirty="0" smtClean="0"/>
-              <a:t>677 users giving 7,195 ratings</a:t>
-            </a:r>
+              <a:t>663 </a:t>
+            </a:r>
+            <a:r>
+              <a:rPr lang="en-US" dirty="0" smtClean="0"/>
+              <a:t>users giving </a:t>
+            </a:r>
+            <a:r>
+              <a:rPr lang="en-US" dirty="0" smtClean="0"/>
+              <a:t>6,008 ratings</a:t>
+            </a:r>
+            <a:endParaRPr lang="en-US" dirty="0" smtClean="0"/>
           </a:p>
           <a:p>
             <a:pPr lvl="1"/>
             <a:r>
               <a:rPr lang="en-US" dirty="0" smtClean="0"/>
-              <a:t>&lt; 3% ratings matrix completed</a:t>
+              <a:t>&lt; </a:t>
+            </a:r>
+            <a:r>
+              <a:rPr lang="en-US" dirty="0" smtClean="0"/>
+              <a:t>3.2% </a:t>
+            </a:r>
+            <a:r>
+              <a:rPr lang="en-US" dirty="0" smtClean="0"/>
+              <a:t>ratings matrix completed</a:t>
             </a:r>
           </a:p>
           <a:p>
@@ -3408,7 +3426,15 @@
           <a:p>
             <a:r>
               <a:rPr lang="en-US" dirty="0" smtClean="0"/>
-              <a:t>k = 147, MSE &lt; 0.00002</a:t>
+              <a:t>k = </a:t>
+            </a:r>
+            <a:r>
+              <a:rPr lang="en-US" dirty="0" smtClean="0"/>
+              <a:t>143, </a:t>
+            </a:r>
+            <a:r>
+              <a:rPr lang="en-US" dirty="0" smtClean="0"/>
+              <a:t>MSE &lt; 0.00002</a:t>
             </a:r>
           </a:p>
           <a:p>
@@ -3471,13 +3497,11 @@
       </p:sp>
       <p:pic>
         <p:nvPicPr>
-          <p:cNvPr id="4" name="Content Placeholder 3"/>
+          <p:cNvPr id="1026" name="Picture 2"/>
           <p:cNvPicPr>
-            <a:picLocks noGrp="1"/>
+            <a:picLocks noChangeAspect="1" noChangeArrowheads="1"/>
           </p:cNvPicPr>
-          <p:nvPr>
-            <p:ph idx="1"/>
-          </p:nvPr>
+          <p:nvPr/>
         </p:nvPicPr>
         <p:blipFill>
           <a:blip r:embed="rId2">
@@ -3494,13 +3518,45 @@
         </p:blipFill>
         <p:spPr bwMode="auto">
           <a:xfrm>
-            <a:off x="46389" y="1295400"/>
-            <a:ext cx="9001040" cy="5410200"/>
+            <a:off x="76200" y="1336138"/>
+            <a:ext cx="8932606" cy="5369462"/>
           </a:xfrm>
           <a:prstGeom prst="rect">
             <a:avLst/>
           </a:prstGeom>
           <a:noFill/>
+          <a:ln>
+            <a:noFill/>
+          </a:ln>
+          <a:effectLst/>
+          <a:extLst>
+            <a:ext uri="{909E8E84-426E-40DD-AFC4-6F175D3DCCD1}">
+              <a14:hiddenFill xmlns:a14="http://schemas.microsoft.com/office/drawing/2010/main">
+                <a:solidFill>
+                  <a:schemeClr val="accent1"/>
+                </a:solidFill>
+              </a14:hiddenFill>
+            </a:ext>
+            <a:ext uri="{91240B29-F687-4F45-9708-019B960494DF}">
+              <a14:hiddenLine xmlns:a14="http://schemas.microsoft.com/office/drawing/2010/main" w="9525">
+                <a:solidFill>
+                  <a:schemeClr val="tx1"/>
+                </a:solidFill>
+                <a:miter lim="800000"/>
+                <a:headEnd/>
+                <a:tailEnd/>
+              </a14:hiddenLine>
+            </a:ext>
+            <a:ext uri="{AF507438-7753-43E0-B8FC-AC1667EBCBE1}">
+              <a14:hiddenEffects xmlns:a14="http://schemas.microsoft.com/office/drawing/2010/main">
+                <a:effectLst>
+                  <a:outerShdw dist="35921" dir="2700000" algn="ctr" rotWithShape="0">
+                    <a:schemeClr val="bg2"/>
+                  </a:outerShdw>
+                </a:effectLst>
+              </a14:hiddenEffects>
+            </a:ext>
+          </a:extLst>
         </p:spPr>
       </p:pic>
     </p:spTree>

</xml_diff>

<commit_message>
2nd report draft, still need to finish presentation
</commit_message>
<xml_diff>
--- a/Presentation.pptx
+++ b/Presentation.pptx
@@ -12,6 +12,7 @@
     <p:sldId id="259" r:id="rId6"/>
     <p:sldId id="262" r:id="rId7"/>
     <p:sldId id="260" r:id="rId8"/>
+    <p:sldId id="263" r:id="rId9"/>
   </p:sldIdLst>
   <p:sldSz cx="9144000" cy="6858000" type="screen4x3"/>
   <p:notesSz cx="6858000" cy="9144000"/>
@@ -294,7 +295,7 @@
           <a:p>
             <a:fld id="{E436E0E4-200F-41E8-A9F0-6E75F5AC3ED2}" type="datetimeFigureOut">
               <a:rPr lang="en-US" smtClean="0"/>
-              <a:t>4/21/2013</a:t>
+              <a:t>4/22/2013</a:t>
             </a:fld>
             <a:endParaRPr lang="en-US"/>
           </a:p>
@@ -464,7 +465,7 @@
           <a:p>
             <a:fld id="{E436E0E4-200F-41E8-A9F0-6E75F5AC3ED2}" type="datetimeFigureOut">
               <a:rPr lang="en-US" smtClean="0"/>
-              <a:t>4/21/2013</a:t>
+              <a:t>4/22/2013</a:t>
             </a:fld>
             <a:endParaRPr lang="en-US"/>
           </a:p>
@@ -644,7 +645,7 @@
           <a:p>
             <a:fld id="{E436E0E4-200F-41E8-A9F0-6E75F5AC3ED2}" type="datetimeFigureOut">
               <a:rPr lang="en-US" smtClean="0"/>
-              <a:t>4/21/2013</a:t>
+              <a:t>4/22/2013</a:t>
             </a:fld>
             <a:endParaRPr lang="en-US"/>
           </a:p>
@@ -814,7 +815,7 @@
           <a:p>
             <a:fld id="{E436E0E4-200F-41E8-A9F0-6E75F5AC3ED2}" type="datetimeFigureOut">
               <a:rPr lang="en-US" smtClean="0"/>
-              <a:t>4/21/2013</a:t>
+              <a:t>4/22/2013</a:t>
             </a:fld>
             <a:endParaRPr lang="en-US"/>
           </a:p>
@@ -1060,7 +1061,7 @@
           <a:p>
             <a:fld id="{E436E0E4-200F-41E8-A9F0-6E75F5AC3ED2}" type="datetimeFigureOut">
               <a:rPr lang="en-US" smtClean="0"/>
-              <a:t>4/21/2013</a:t>
+              <a:t>4/22/2013</a:t>
             </a:fld>
             <a:endParaRPr lang="en-US"/>
           </a:p>
@@ -1348,7 +1349,7 @@
           <a:p>
             <a:fld id="{E436E0E4-200F-41E8-A9F0-6E75F5AC3ED2}" type="datetimeFigureOut">
               <a:rPr lang="en-US" smtClean="0"/>
-              <a:t>4/21/2013</a:t>
+              <a:t>4/22/2013</a:t>
             </a:fld>
             <a:endParaRPr lang="en-US"/>
           </a:p>
@@ -1770,7 +1771,7 @@
           <a:p>
             <a:fld id="{E436E0E4-200F-41E8-A9F0-6E75F5AC3ED2}" type="datetimeFigureOut">
               <a:rPr lang="en-US" smtClean="0"/>
-              <a:t>4/21/2013</a:t>
+              <a:t>4/22/2013</a:t>
             </a:fld>
             <a:endParaRPr lang="en-US"/>
           </a:p>
@@ -1888,7 +1889,7 @@
           <a:p>
             <a:fld id="{E436E0E4-200F-41E8-A9F0-6E75F5AC3ED2}" type="datetimeFigureOut">
               <a:rPr lang="en-US" smtClean="0"/>
-              <a:t>4/21/2013</a:t>
+              <a:t>4/22/2013</a:t>
             </a:fld>
             <a:endParaRPr lang="en-US"/>
           </a:p>
@@ -1983,7 +1984,7 @@
           <a:p>
             <a:fld id="{E436E0E4-200F-41E8-A9F0-6E75F5AC3ED2}" type="datetimeFigureOut">
               <a:rPr lang="en-US" smtClean="0"/>
-              <a:t>4/21/2013</a:t>
+              <a:t>4/22/2013</a:t>
             </a:fld>
             <a:endParaRPr lang="en-US"/>
           </a:p>
@@ -2260,7 +2261,7 @@
           <a:p>
             <a:fld id="{E436E0E4-200F-41E8-A9F0-6E75F5AC3ED2}" type="datetimeFigureOut">
               <a:rPr lang="en-US" smtClean="0"/>
-              <a:t>4/21/2013</a:t>
+              <a:t>4/22/2013</a:t>
             </a:fld>
             <a:endParaRPr lang="en-US"/>
           </a:p>
@@ -2513,7 +2514,7 @@
           <a:p>
             <a:fld id="{E436E0E4-200F-41E8-A9F0-6E75F5AC3ED2}" type="datetimeFigureOut">
               <a:rPr lang="en-US" smtClean="0"/>
-              <a:t>4/21/2013</a:t>
+              <a:t>4/22/2013</a:t>
             </a:fld>
             <a:endParaRPr lang="en-US"/>
           </a:p>
@@ -2726,7 +2727,7 @@
           <a:p>
             <a:fld id="{E436E0E4-200F-41E8-A9F0-6E75F5AC3ED2}" type="datetimeFigureOut">
               <a:rPr lang="en-US" smtClean="0"/>
-              <a:t>4/21/2013</a:t>
+              <a:t>4/22/2013</a:t>
             </a:fld>
             <a:endParaRPr lang="en-US"/>
           </a:p>
@@ -3232,26 +3233,14 @@
             <a:pPr lvl="1"/>
             <a:r>
               <a:rPr lang="en-US" dirty="0" smtClean="0"/>
-              <a:t>2255 </a:t>
-            </a:r>
+              <a:t>2255 users giving 6,008 ratings</a:t>
+            </a:r>
+          </a:p>
+          <a:p>
+            <a:pPr lvl="1"/>
             <a:r>
               <a:rPr lang="en-US" dirty="0" smtClean="0"/>
-              <a:t>users giving 6,008 ratings</a:t>
-            </a:r>
-          </a:p>
-          <a:p>
-            <a:pPr lvl="1"/>
-            <a:r>
-              <a:rPr lang="en-US" dirty="0" smtClean="0"/>
-              <a:t>&lt; </a:t>
-            </a:r>
-            <a:r>
-              <a:rPr lang="en-US" dirty="0" smtClean="0"/>
-              <a:t>1% </a:t>
-            </a:r>
-            <a:r>
-              <a:rPr lang="en-US" dirty="0" smtClean="0"/>
-              <a:t>ratings matrix completed</a:t>
+              <a:t>&lt; 1% ratings matrix completed</a:t>
             </a:r>
           </a:p>
           <a:p>
@@ -3420,21 +3409,8 @@
           <a:p>
             <a:r>
               <a:rPr lang="en-US" dirty="0" smtClean="0"/>
-              <a:t>k = </a:t>
-            </a:r>
-            <a:r>
-              <a:rPr lang="en-US" dirty="0" smtClean="0"/>
-              <a:t>257, </a:t>
-            </a:r>
-            <a:r>
-              <a:rPr lang="en-US" dirty="0" smtClean="0"/>
-              <a:t>MSE &lt; </a:t>
-            </a:r>
-            <a:r>
-              <a:rPr lang="en-US" dirty="0" smtClean="0"/>
-              <a:t>0.0000008</a:t>
-            </a:r>
-            <a:endParaRPr lang="en-US" dirty="0" smtClean="0"/>
+              <a:t>k = 257, MSE &lt; 0.0000008</a:t>
+            </a:r>
           </a:p>
           <a:p>
             <a:endParaRPr lang="en-US" dirty="0"/>
@@ -3815,9 +3791,20 @@
           </a:p>
           <a:p>
             <a:r>
-              <a:rPr lang="en-US" smtClean="0"/>
-              <a:t>More empirical results on recommendations</a:t>
-            </a:r>
+              <a:rPr lang="en-US" dirty="0" smtClean="0"/>
+              <a:t>More empirical results on </a:t>
+            </a:r>
+            <a:r>
+              <a:rPr lang="en-US" dirty="0" smtClean="0"/>
+              <a:t>recommendations</a:t>
+            </a:r>
+          </a:p>
+          <a:p>
+            <a:r>
+              <a:rPr lang="en-US" dirty="0" smtClean="0"/>
+              <a:t>Automatic prediction updates</a:t>
+            </a:r>
+            <a:endParaRPr lang="en-US" dirty="0" smtClean="0"/>
           </a:p>
         </p:txBody>
       </p:sp>
@@ -3825,6 +3812,79 @@
     <p:extLst>
       <p:ext uri="{BB962C8B-B14F-4D97-AF65-F5344CB8AC3E}">
         <p14:creationId xmlns:p14="http://schemas.microsoft.com/office/powerpoint/2010/main" val="898282114"/>
+      </p:ext>
+    </p:extLst>
+  </p:cSld>
+  <p:clrMapOvr>
+    <a:masterClrMapping/>
+  </p:clrMapOvr>
+</p:sld>
+</file>
+
+<file path=ppt/slides/slide8.xml><?xml version="1.0" encoding="utf-8"?>
+<p:sld xmlns:a="http://schemas.openxmlformats.org/drawingml/2006/main" xmlns:r="http://schemas.openxmlformats.org/officeDocument/2006/relationships" xmlns:p="http://schemas.openxmlformats.org/presentationml/2006/main">
+  <p:cSld>
+    <p:spTree>
+      <p:nvGrpSpPr>
+        <p:cNvPr id="1" name=""/>
+        <p:cNvGrpSpPr/>
+        <p:nvPr/>
+      </p:nvGrpSpPr>
+      <p:grpSpPr>
+        <a:xfrm>
+          <a:off x="0" y="0"/>
+          <a:ext cx="0" cy="0"/>
+          <a:chOff x="0" y="0"/>
+          <a:chExt cx="0" cy="0"/>
+        </a:xfrm>
+      </p:grpSpPr>
+      <p:sp>
+        <p:nvSpPr>
+          <p:cNvPr id="2" name="Title 1"/>
+          <p:cNvSpPr>
+            <a:spLocks noGrp="1"/>
+          </p:cNvSpPr>
+          <p:nvPr>
+            <p:ph type="title"/>
+          </p:nvPr>
+        </p:nvSpPr>
+        <p:spPr/>
+        <p:txBody>
+          <a:bodyPr/>
+          <a:lstStyle/>
+          <a:p>
+            <a:pPr algn="ctr"/>
+            <a:r>
+              <a:rPr lang="en-US" dirty="0" smtClean="0"/>
+              <a:t>Questions?</a:t>
+            </a:r>
+            <a:endParaRPr lang="en-US" dirty="0"/>
+          </a:p>
+        </p:txBody>
+      </p:sp>
+      <p:sp>
+        <p:nvSpPr>
+          <p:cNvPr id="3" name="Text Placeholder 2"/>
+          <p:cNvSpPr>
+            <a:spLocks noGrp="1"/>
+          </p:cNvSpPr>
+          <p:nvPr>
+            <p:ph type="body" idx="1"/>
+          </p:nvPr>
+        </p:nvSpPr>
+        <p:spPr/>
+        <p:txBody>
+          <a:bodyPr/>
+          <a:lstStyle/>
+          <a:p>
+            <a:endParaRPr lang="en-US"/>
+          </a:p>
+        </p:txBody>
+      </p:sp>
+    </p:spTree>
+    <p:extLst>
+      <p:ext uri="{BB962C8B-B14F-4D97-AF65-F5344CB8AC3E}">
+        <p14:creationId xmlns:p14="http://schemas.microsoft.com/office/powerpoint/2010/main" val="1756176353"/>
       </p:ext>
     </p:extLst>
   </p:cSld>

</xml_diff>